<commit_message>
Added Control Systems slides
</commit_message>
<xml_diff>
--- a/Documentation/Final/Final Presentation.pptx
+++ b/Documentation/Final/Final Presentation.pptx
@@ -5,7 +5,7 @@
     <p:sldMasterId id="2147483684" r:id="rId1"/>
   </p:sldMasterIdLst>
   <p:notesMasterIdLst>
-    <p:notesMasterId r:id="rId15"/>
+    <p:notesMasterId r:id="rId17"/>
   </p:notesMasterIdLst>
   <p:sldIdLst>
     <p:sldId id="256" r:id="rId2"/>
@@ -14,13 +14,15 @@
     <p:sldId id="308" r:id="rId5"/>
     <p:sldId id="307" r:id="rId6"/>
     <p:sldId id="268" r:id="rId7"/>
-    <p:sldId id="291" r:id="rId8"/>
-    <p:sldId id="305" r:id="rId9"/>
-    <p:sldId id="296" r:id="rId10"/>
-    <p:sldId id="276" r:id="rId11"/>
-    <p:sldId id="289" r:id="rId12"/>
-    <p:sldId id="294" r:id="rId13"/>
-    <p:sldId id="306" r:id="rId14"/>
+    <p:sldId id="310" r:id="rId8"/>
+    <p:sldId id="312" r:id="rId9"/>
+    <p:sldId id="291" r:id="rId10"/>
+    <p:sldId id="305" r:id="rId11"/>
+    <p:sldId id="296" r:id="rId12"/>
+    <p:sldId id="276" r:id="rId13"/>
+    <p:sldId id="289" r:id="rId14"/>
+    <p:sldId id="294" r:id="rId15"/>
+    <p:sldId id="306" r:id="rId16"/>
   </p:sldIdLst>
   <p:sldSz cx="9144000" cy="6858000" type="screen4x3"/>
   <p:notesSz cx="6858000" cy="9144000"/>
@@ -606,8 +608,19 @@
           <a:p>
             <a:r>
               <a:rPr lang="en-US" dirty="0" smtClean="0"/>
-              <a:t>Ruffin</a:t>
-            </a:r>
+              <a:t>Spencer</a:t>
+            </a:r>
+            <a:endParaRPr lang="en-US" sz="1200" kern="1200" dirty="0" smtClean="0">
+              <a:solidFill>
+                <a:schemeClr val="tx1"/>
+              </a:solidFill>
+              <a:effectLst/>
+              <a:latin typeface="+mn-lt"/>
+              <a:ea typeface="+mn-ea"/>
+              <a:cs typeface="+mn-cs"/>
+            </a:endParaRPr>
+          </a:p>
+          <a:p>
             <a:endParaRPr lang="en-US" dirty="0"/>
           </a:p>
         </p:txBody>
@@ -638,7 +651,7 @@
     </p:spTree>
     <p:extLst>
       <p:ext uri="{BB962C8B-B14F-4D97-AF65-F5344CB8AC3E}">
-        <p14:creationId xmlns:p14="http://schemas.microsoft.com/office/powerpoint/2010/main" val="1285917308"/>
+        <p14:creationId xmlns:p14="http://schemas.microsoft.com/office/powerpoint/2010/main" val="1980168297"/>
       </p:ext>
     </p:extLst>
   </p:cSld>
@@ -694,7 +707,7 @@
           <a:p>
             <a:r>
               <a:rPr lang="en-US" dirty="0" smtClean="0"/>
-              <a:t>Ruffin</a:t>
+              <a:t>Spencer</a:t>
             </a:r>
             <a:endParaRPr lang="en-US" dirty="0"/>
           </a:p>
@@ -726,7 +739,7 @@
     </p:spTree>
     <p:extLst>
       <p:ext uri="{BB962C8B-B14F-4D97-AF65-F5344CB8AC3E}">
-        <p14:creationId xmlns:p14="http://schemas.microsoft.com/office/powerpoint/2010/main" val="1285917308"/>
+        <p14:creationId xmlns:p14="http://schemas.microsoft.com/office/powerpoint/2010/main" val="1747577525"/>
       </p:ext>
     </p:extLst>
   </p:cSld>
@@ -814,7 +827,7 @@
     </p:spTree>
     <p:extLst>
       <p:ext uri="{BB962C8B-B14F-4D97-AF65-F5344CB8AC3E}">
-        <p14:creationId xmlns:p14="http://schemas.microsoft.com/office/powerpoint/2010/main" val="1747577525"/>
+        <p14:creationId xmlns:p14="http://schemas.microsoft.com/office/powerpoint/2010/main" val="1285917308"/>
       </p:ext>
     </p:extLst>
   </p:cSld>
@@ -894,6 +907,182 @@
             <a:fld id="{774118CE-2326-4E90-83DF-11ED7A461FE5}" type="slidenum">
               <a:rPr lang="en-US" smtClean="0"/>
               <a:t>13</a:t>
+            </a:fld>
+            <a:endParaRPr lang="en-US"/>
+          </a:p>
+        </p:txBody>
+      </p:sp>
+    </p:spTree>
+    <p:extLst>
+      <p:ext uri="{BB962C8B-B14F-4D97-AF65-F5344CB8AC3E}">
+        <p14:creationId xmlns:p14="http://schemas.microsoft.com/office/powerpoint/2010/main" val="1285917308"/>
+      </p:ext>
+    </p:extLst>
+  </p:cSld>
+  <p:clrMapOvr>
+    <a:masterClrMapping/>
+  </p:clrMapOvr>
+</p:notes>
+</file>
+
+<file path=ppt/notesSlides/notesSlide14.xml><?xml version="1.0" encoding="utf-8"?>
+<p:notes xmlns:a="http://schemas.openxmlformats.org/drawingml/2006/main" xmlns:r="http://schemas.openxmlformats.org/officeDocument/2006/relationships" xmlns:p="http://schemas.openxmlformats.org/presentationml/2006/main">
+  <p:cSld>
+    <p:spTree>
+      <p:nvGrpSpPr>
+        <p:cNvPr id="1" name=""/>
+        <p:cNvGrpSpPr/>
+        <p:nvPr/>
+      </p:nvGrpSpPr>
+      <p:grpSpPr>
+        <a:xfrm>
+          <a:off x="0" y="0"/>
+          <a:ext cx="0" cy="0"/>
+          <a:chOff x="0" y="0"/>
+          <a:chExt cx="0" cy="0"/>
+        </a:xfrm>
+      </p:grpSpPr>
+      <p:sp>
+        <p:nvSpPr>
+          <p:cNvPr id="2" name="Slide Image Placeholder 1"/>
+          <p:cNvSpPr>
+            <a:spLocks noGrp="1" noRot="1" noChangeAspect="1"/>
+          </p:cNvSpPr>
+          <p:nvPr>
+            <p:ph type="sldImg"/>
+          </p:nvPr>
+        </p:nvSpPr>
+        <p:spPr/>
+      </p:sp>
+      <p:sp>
+        <p:nvSpPr>
+          <p:cNvPr id="3" name="Notes Placeholder 2"/>
+          <p:cNvSpPr>
+            <a:spLocks noGrp="1"/>
+          </p:cNvSpPr>
+          <p:nvPr>
+            <p:ph type="body" idx="1"/>
+          </p:nvPr>
+        </p:nvSpPr>
+        <p:spPr/>
+        <p:txBody>
+          <a:bodyPr/>
+          <a:lstStyle/>
+          <a:p>
+            <a:r>
+              <a:rPr lang="en-US" dirty="0" smtClean="0"/>
+              <a:t>Ruffin</a:t>
+            </a:r>
+            <a:endParaRPr lang="en-US" dirty="0"/>
+          </a:p>
+        </p:txBody>
+      </p:sp>
+      <p:sp>
+        <p:nvSpPr>
+          <p:cNvPr id="4" name="Slide Number Placeholder 3"/>
+          <p:cNvSpPr>
+            <a:spLocks noGrp="1"/>
+          </p:cNvSpPr>
+          <p:nvPr>
+            <p:ph type="sldNum" sz="quarter" idx="10"/>
+          </p:nvPr>
+        </p:nvSpPr>
+        <p:spPr/>
+        <p:txBody>
+          <a:bodyPr/>
+          <a:lstStyle/>
+          <a:p>
+            <a:fld id="{774118CE-2326-4E90-83DF-11ED7A461FE5}" type="slidenum">
+              <a:rPr lang="en-US" smtClean="0"/>
+              <a:t>14</a:t>
+            </a:fld>
+            <a:endParaRPr lang="en-US"/>
+          </a:p>
+        </p:txBody>
+      </p:sp>
+    </p:spTree>
+    <p:extLst>
+      <p:ext uri="{BB962C8B-B14F-4D97-AF65-F5344CB8AC3E}">
+        <p14:creationId xmlns:p14="http://schemas.microsoft.com/office/powerpoint/2010/main" val="1747577525"/>
+      </p:ext>
+    </p:extLst>
+  </p:cSld>
+  <p:clrMapOvr>
+    <a:masterClrMapping/>
+  </p:clrMapOvr>
+</p:notes>
+</file>
+
+<file path=ppt/notesSlides/notesSlide15.xml><?xml version="1.0" encoding="utf-8"?>
+<p:notes xmlns:a="http://schemas.openxmlformats.org/drawingml/2006/main" xmlns:r="http://schemas.openxmlformats.org/officeDocument/2006/relationships" xmlns:p="http://schemas.openxmlformats.org/presentationml/2006/main">
+  <p:cSld>
+    <p:spTree>
+      <p:nvGrpSpPr>
+        <p:cNvPr id="1" name=""/>
+        <p:cNvGrpSpPr/>
+        <p:nvPr/>
+      </p:nvGrpSpPr>
+      <p:grpSpPr>
+        <a:xfrm>
+          <a:off x="0" y="0"/>
+          <a:ext cx="0" cy="0"/>
+          <a:chOff x="0" y="0"/>
+          <a:chExt cx="0" cy="0"/>
+        </a:xfrm>
+      </p:grpSpPr>
+      <p:sp>
+        <p:nvSpPr>
+          <p:cNvPr id="2" name="Slide Image Placeholder 1"/>
+          <p:cNvSpPr>
+            <a:spLocks noGrp="1" noRot="1" noChangeAspect="1"/>
+          </p:cNvSpPr>
+          <p:nvPr>
+            <p:ph type="sldImg"/>
+          </p:nvPr>
+        </p:nvSpPr>
+        <p:spPr/>
+      </p:sp>
+      <p:sp>
+        <p:nvSpPr>
+          <p:cNvPr id="3" name="Notes Placeholder 2"/>
+          <p:cNvSpPr>
+            <a:spLocks noGrp="1"/>
+          </p:cNvSpPr>
+          <p:nvPr>
+            <p:ph type="body" idx="1"/>
+          </p:nvPr>
+        </p:nvSpPr>
+        <p:spPr/>
+        <p:txBody>
+          <a:bodyPr/>
+          <a:lstStyle/>
+          <a:p>
+            <a:r>
+              <a:rPr lang="en-US" dirty="0" smtClean="0"/>
+              <a:t>Ruffin</a:t>
+            </a:r>
+            <a:endParaRPr lang="en-US" dirty="0"/>
+          </a:p>
+        </p:txBody>
+      </p:sp>
+      <p:sp>
+        <p:nvSpPr>
+          <p:cNvPr id="4" name="Slide Number Placeholder 3"/>
+          <p:cNvSpPr>
+            <a:spLocks noGrp="1"/>
+          </p:cNvSpPr>
+          <p:nvPr>
+            <p:ph type="sldNum" sz="quarter" idx="10"/>
+          </p:nvPr>
+        </p:nvSpPr>
+        <p:spPr/>
+        <p:txBody>
+          <a:bodyPr/>
+          <a:lstStyle/>
+          <a:p>
+            <a:fld id="{774118CE-2326-4E90-83DF-11ED7A461FE5}" type="slidenum">
+              <a:rPr lang="en-US" smtClean="0"/>
+              <a:t>15</a:t>
             </a:fld>
             <a:endParaRPr lang="en-US"/>
           </a:p>
@@ -1480,21 +1669,28 @@
           <a:bodyPr/>
           <a:lstStyle/>
           <a:p>
-            <a:r>
-              <a:rPr lang="en-US" sz="1200" kern="1200" dirty="0" smtClean="0">
-                <a:solidFill>
-                  <a:schemeClr val="tx1"/>
-                </a:solidFill>
-                <a:effectLst/>
-                <a:latin typeface="+mn-lt"/>
-                <a:ea typeface="+mn-ea"/>
-                <a:cs typeface="+mn-cs"/>
-              </a:rPr>
-              <a:t>Spencer</a:t>
-            </a:r>
-          </a:p>
-          <a:p>
-            <a:endParaRPr lang="en-US" dirty="0"/>
+            <a:pPr marL="0" marR="0" indent="0" algn="l" defTabSz="914400" rtl="0" eaLnBrk="1" fontAlgn="auto" latinLnBrk="0" hangingPunct="1">
+              <a:lnSpc>
+                <a:spcPct val="100000"/>
+              </a:lnSpc>
+              <a:spcBef>
+                <a:spcPts val="0"/>
+              </a:spcBef>
+              <a:spcAft>
+                <a:spcPts val="0"/>
+              </a:spcAft>
+              <a:buClrTx/>
+              <a:buSzTx/>
+              <a:buFontTx/>
+              <a:buNone/>
+              <a:tabLst/>
+              <a:defRPr/>
+            </a:pPr>
+            <a:r>
+              <a:rPr lang="en-US" dirty="0" smtClean="0"/>
+              <a:t>Ander</a:t>
+            </a:r>
+            <a:endParaRPr lang="en-US" baseline="0" dirty="0" smtClean="0"/>
           </a:p>
         </p:txBody>
       </p:sp>
@@ -1524,7 +1720,7 @@
     </p:spTree>
     <p:extLst>
       <p:ext uri="{BB962C8B-B14F-4D97-AF65-F5344CB8AC3E}">
-        <p14:creationId xmlns:p14="http://schemas.microsoft.com/office/powerpoint/2010/main" val="1980168297"/>
+        <p14:creationId xmlns:p14="http://schemas.microsoft.com/office/powerpoint/2010/main" val="62533980"/>
       </p:ext>
     </p:extLst>
   </p:cSld>
@@ -1578,22 +1774,28 @@
           <a:bodyPr/>
           <a:lstStyle/>
           <a:p>
+            <a:pPr marL="0" marR="0" indent="0" algn="l" defTabSz="914400" rtl="0" eaLnBrk="1" fontAlgn="auto" latinLnBrk="0" hangingPunct="1">
+              <a:lnSpc>
+                <a:spcPct val="100000"/>
+              </a:lnSpc>
+              <a:spcBef>
+                <a:spcPts val="0"/>
+              </a:spcBef>
+              <a:spcAft>
+                <a:spcPts val="0"/>
+              </a:spcAft>
+              <a:buClrTx/>
+              <a:buSzTx/>
+              <a:buFontTx/>
+              <a:buNone/>
+              <a:tabLst/>
+              <a:defRPr/>
+            </a:pPr>
             <a:r>
               <a:rPr lang="en-US" dirty="0" smtClean="0"/>
-              <a:t>Spencer</a:t>
-            </a:r>
-            <a:endParaRPr lang="en-US" sz="1200" kern="1200" dirty="0" smtClean="0">
-              <a:solidFill>
-                <a:schemeClr val="tx1"/>
-              </a:solidFill>
-              <a:effectLst/>
-              <a:latin typeface="+mn-lt"/>
-              <a:ea typeface="+mn-ea"/>
-              <a:cs typeface="+mn-cs"/>
-            </a:endParaRPr>
-          </a:p>
-          <a:p>
-            <a:endParaRPr lang="en-US" dirty="0"/>
+              <a:t>Ander</a:t>
+            </a:r>
+            <a:endParaRPr lang="en-US" baseline="0" dirty="0" smtClean="0"/>
           </a:p>
         </p:txBody>
       </p:sp>
@@ -1623,7 +1825,7 @@
     </p:spTree>
     <p:extLst>
       <p:ext uri="{BB962C8B-B14F-4D97-AF65-F5344CB8AC3E}">
-        <p14:creationId xmlns:p14="http://schemas.microsoft.com/office/powerpoint/2010/main" val="1980168297"/>
+        <p14:creationId xmlns:p14="http://schemas.microsoft.com/office/powerpoint/2010/main" val="62533980"/>
       </p:ext>
     </p:extLst>
   </p:cSld>
@@ -1678,9 +1880,19 @@
           <a:lstStyle/>
           <a:p>
             <a:r>
-              <a:rPr lang="en-US" dirty="0" smtClean="0"/>
+              <a:rPr lang="en-US" sz="1200" kern="1200" dirty="0" smtClean="0">
+                <a:solidFill>
+                  <a:schemeClr val="tx1"/>
+                </a:solidFill>
+                <a:effectLst/>
+                <a:latin typeface="+mn-lt"/>
+                <a:ea typeface="+mn-ea"/>
+                <a:cs typeface="+mn-cs"/>
+              </a:rPr>
               <a:t>Spencer</a:t>
             </a:r>
+          </a:p>
+          <a:p>
             <a:endParaRPr lang="en-US" dirty="0"/>
           </a:p>
         </p:txBody>
@@ -1711,7 +1923,7 @@
     </p:spTree>
     <p:extLst>
       <p:ext uri="{BB962C8B-B14F-4D97-AF65-F5344CB8AC3E}">
-        <p14:creationId xmlns:p14="http://schemas.microsoft.com/office/powerpoint/2010/main" val="1747577525"/>
+        <p14:creationId xmlns:p14="http://schemas.microsoft.com/office/powerpoint/2010/main" val="1980168297"/>
       </p:ext>
     </p:extLst>
   </p:cSld>
@@ -5090,6 +5302,616 @@
 <file path=ppt/slides/slide10.xml><?xml version="1.0" encoding="utf-8"?>
 <p:sld xmlns:a="http://schemas.openxmlformats.org/drawingml/2006/main" xmlns:r="http://schemas.openxmlformats.org/officeDocument/2006/relationships" xmlns:p="http://schemas.openxmlformats.org/presentationml/2006/main">
   <p:cSld>
+    <p:spTree>
+      <p:nvGrpSpPr>
+        <p:cNvPr id="1" name=""/>
+        <p:cNvGrpSpPr/>
+        <p:nvPr/>
+      </p:nvGrpSpPr>
+      <p:grpSpPr>
+        <a:xfrm>
+          <a:off x="0" y="0"/>
+          <a:ext cx="0" cy="0"/>
+          <a:chOff x="0" y="0"/>
+          <a:chExt cx="0" cy="0"/>
+        </a:xfrm>
+      </p:grpSpPr>
+      <p:pic>
+        <p:nvPicPr>
+          <p:cNvPr id="8" name="Picture 7"/>
+          <p:cNvPicPr>
+            <a:picLocks noChangeAspect="1"/>
+          </p:cNvPicPr>
+          <p:nvPr/>
+        </p:nvPicPr>
+        <p:blipFill>
+          <a:blip r:embed="rId3">
+            <a:extLst>
+              <a:ext uri="{28A0092B-C50C-407E-A947-70E740481C1C}">
+                <a14:useLocalDpi xmlns:a14="http://schemas.microsoft.com/office/drawing/2010/main" val="0"/>
+              </a:ext>
+            </a:extLst>
+          </a:blip>
+          <a:stretch>
+            <a:fillRect/>
+          </a:stretch>
+        </p:blipFill>
+        <p:spPr>
+          <a:xfrm>
+            <a:off x="8572" y="0"/>
+            <a:ext cx="9126855" cy="6858000"/>
+          </a:xfrm>
+          <a:prstGeom prst="rect">
+            <a:avLst/>
+          </a:prstGeom>
+        </p:spPr>
+      </p:pic>
+      <p:sp>
+        <p:nvSpPr>
+          <p:cNvPr id="5" name="Rectangle 4"/>
+          <p:cNvSpPr/>
+          <p:nvPr/>
+        </p:nvSpPr>
+        <p:spPr>
+          <a:xfrm>
+            <a:off x="1066800" y="685800"/>
+            <a:ext cx="7010400" cy="685800"/>
+          </a:xfrm>
+          <a:prstGeom prst="rect">
+            <a:avLst/>
+          </a:prstGeom>
+          <a:gradFill flip="none" rotWithShape="1">
+            <a:gsLst>
+              <a:gs pos="100000">
+                <a:schemeClr val="bg1">
+                  <a:tint val="90000"/>
+                </a:schemeClr>
+              </a:gs>
+              <a:gs pos="100000">
+                <a:schemeClr val="bg1">
+                  <a:shade val="100000"/>
+                  <a:satMod val="115000"/>
+                </a:schemeClr>
+              </a:gs>
+              <a:gs pos="0">
+                <a:srgbClr val="8390CF"/>
+              </a:gs>
+            </a:gsLst>
+            <a:lin ang="0" scaled="0"/>
+            <a:tileRect/>
+          </a:gradFill>
+          <a:ln>
+            <a:noFill/>
+          </a:ln>
+        </p:spPr>
+        <p:style>
+          <a:lnRef idx="2">
+            <a:schemeClr val="accent1">
+              <a:shade val="50000"/>
+            </a:schemeClr>
+          </a:lnRef>
+          <a:fillRef idx="1">
+            <a:schemeClr val="accent1"/>
+          </a:fillRef>
+          <a:effectRef idx="0">
+            <a:schemeClr val="accent1"/>
+          </a:effectRef>
+          <a:fontRef idx="minor">
+            <a:schemeClr val="lt1"/>
+          </a:fontRef>
+        </p:style>
+        <p:txBody>
+          <a:bodyPr rtlCol="0" anchor="ctr"/>
+          <a:lstStyle/>
+          <a:p>
+            <a:pPr algn="ctr"/>
+            <a:endParaRPr lang="en-US"/>
+          </a:p>
+        </p:txBody>
+      </p:sp>
+      <p:sp>
+        <p:nvSpPr>
+          <p:cNvPr id="4" name="TextBox 3"/>
+          <p:cNvSpPr txBox="1"/>
+          <p:nvPr/>
+        </p:nvSpPr>
+        <p:spPr>
+          <a:xfrm>
+            <a:off x="76200" y="772180"/>
+            <a:ext cx="5791200" cy="523220"/>
+          </a:xfrm>
+          <a:prstGeom prst="rect">
+            <a:avLst/>
+          </a:prstGeom>
+          <a:noFill/>
+        </p:spPr>
+        <p:txBody>
+          <a:bodyPr wrap="square" rtlCol="0">
+            <a:spAutoFit/>
+          </a:bodyPr>
+          <a:lstStyle/>
+          <a:p>
+            <a:r>
+              <a:rPr lang="en-US" sz="2800" dirty="0" smtClean="0"/>
+              <a:t>Testing Plan</a:t>
+            </a:r>
+            <a:endParaRPr lang="en-US" sz="2800" dirty="0"/>
+          </a:p>
+        </p:txBody>
+      </p:sp>
+      <p:sp>
+        <p:nvSpPr>
+          <p:cNvPr id="6" name="TextBox 5"/>
+          <p:cNvSpPr txBox="1"/>
+          <p:nvPr/>
+        </p:nvSpPr>
+        <p:spPr>
+          <a:xfrm>
+            <a:off x="0" y="1404878"/>
+            <a:ext cx="2514600" cy="1169551"/>
+          </a:xfrm>
+          <a:prstGeom prst="rect">
+            <a:avLst/>
+          </a:prstGeom>
+          <a:noFill/>
+        </p:spPr>
+        <p:txBody>
+          <a:bodyPr wrap="square" rtlCol="0">
+            <a:spAutoFit/>
+          </a:bodyPr>
+          <a:lstStyle/>
+          <a:p>
+            <a:r>
+              <a:rPr lang="en-US" sz="1400" dirty="0" smtClean="0">
+                <a:solidFill>
+                  <a:schemeClr val="bg1"/>
+                </a:solidFill>
+              </a:rPr>
+              <a:t>Problems</a:t>
+            </a:r>
+          </a:p>
+          <a:p>
+            <a:r>
+              <a:rPr lang="en-US" sz="1400" dirty="0" smtClean="0">
+                <a:solidFill>
+                  <a:schemeClr val="bg1"/>
+                </a:solidFill>
+              </a:rPr>
+              <a:t>Lessons</a:t>
+            </a:r>
+          </a:p>
+          <a:p>
+            <a:r>
+              <a:rPr lang="en-US" sz="1400" dirty="0" smtClean="0">
+                <a:solidFill>
+                  <a:schemeClr val="bg1"/>
+                </a:solidFill>
+              </a:rPr>
+              <a:t>Robot</a:t>
+            </a:r>
+          </a:p>
+          <a:p>
+            <a:r>
+              <a:rPr lang="en-US" sz="1400" dirty="0" smtClean="0">
+                <a:solidFill>
+                  <a:schemeClr val="bg1"/>
+                </a:solidFill>
+              </a:rPr>
+              <a:t>Suggestions</a:t>
+            </a:r>
+          </a:p>
+          <a:p>
+            <a:r>
+              <a:rPr lang="en-US" sz="1400" dirty="0" smtClean="0">
+                <a:solidFill>
+                  <a:schemeClr val="bg1"/>
+                </a:solidFill>
+              </a:rPr>
+              <a:t>Conclusion</a:t>
+            </a:r>
+            <a:endParaRPr lang="en-US" sz="1400" dirty="0">
+              <a:solidFill>
+                <a:schemeClr val="bg1"/>
+              </a:solidFill>
+            </a:endParaRPr>
+          </a:p>
+        </p:txBody>
+      </p:sp>
+      <p:sp>
+        <p:nvSpPr>
+          <p:cNvPr id="7" name="TextBox 6"/>
+          <p:cNvSpPr txBox="1"/>
+          <p:nvPr/>
+        </p:nvSpPr>
+        <p:spPr>
+          <a:xfrm>
+            <a:off x="0" y="-39707"/>
+            <a:ext cx="2514600" cy="954107"/>
+          </a:xfrm>
+          <a:prstGeom prst="rect">
+            <a:avLst/>
+          </a:prstGeom>
+          <a:noFill/>
+        </p:spPr>
+        <p:txBody>
+          <a:bodyPr wrap="square" rtlCol="0">
+            <a:spAutoFit/>
+          </a:bodyPr>
+          <a:lstStyle/>
+          <a:p>
+            <a:r>
+              <a:rPr lang="en-US" sz="1400" dirty="0">
+                <a:solidFill>
+                  <a:schemeClr val="bg1">
+                    <a:lumMod val="75000"/>
+                  </a:schemeClr>
+                </a:solidFill>
+              </a:rPr>
+              <a:t>Recap</a:t>
+            </a:r>
+          </a:p>
+          <a:p>
+            <a:r>
+              <a:rPr lang="en-US" sz="1400" dirty="0">
+                <a:solidFill>
+                  <a:schemeClr val="bg1">
+                    <a:lumMod val="75000"/>
+                  </a:schemeClr>
+                </a:solidFill>
+              </a:rPr>
+              <a:t>Controls</a:t>
+            </a:r>
+          </a:p>
+          <a:p>
+            <a:r>
+              <a:rPr lang="en-US" sz="1400" dirty="0">
+                <a:solidFill>
+                  <a:schemeClr val="bg1">
+                    <a:lumMod val="75000"/>
+                  </a:schemeClr>
+                </a:solidFill>
+              </a:rPr>
+              <a:t>Code</a:t>
+            </a:r>
+          </a:p>
+          <a:p>
+            <a:endParaRPr lang="en-US" sz="1400" dirty="0">
+              <a:solidFill>
+                <a:schemeClr val="bg1">
+                  <a:lumMod val="75000"/>
+                </a:schemeClr>
+              </a:solidFill>
+            </a:endParaRPr>
+          </a:p>
+        </p:txBody>
+      </p:sp>
+    </p:spTree>
+    <p:extLst>
+      <p:ext uri="{BB962C8B-B14F-4D97-AF65-F5344CB8AC3E}">
+        <p14:creationId xmlns:p14="http://schemas.microsoft.com/office/powerpoint/2010/main" val="4110614398"/>
+      </p:ext>
+    </p:extLst>
+  </p:cSld>
+  <p:clrMapOvr>
+    <a:masterClrMapping/>
+  </p:clrMapOvr>
+  <p:timing>
+    <p:tnLst>
+      <p:par>
+        <p:cTn id="1" dur="indefinite" restart="never" nodeType="tmRoot"/>
+      </p:par>
+    </p:tnLst>
+  </p:timing>
+</p:sld>
+</file>
+
+<file path=ppt/slides/slide11.xml><?xml version="1.0" encoding="utf-8"?>
+<p:sld xmlns:a="http://schemas.openxmlformats.org/drawingml/2006/main" xmlns:r="http://schemas.openxmlformats.org/officeDocument/2006/relationships" xmlns:p="http://schemas.openxmlformats.org/presentationml/2006/main">
+  <p:cSld>
+    <p:spTree>
+      <p:nvGrpSpPr>
+        <p:cNvPr id="1" name=""/>
+        <p:cNvGrpSpPr/>
+        <p:nvPr/>
+      </p:nvGrpSpPr>
+      <p:grpSpPr>
+        <a:xfrm>
+          <a:off x="0" y="0"/>
+          <a:ext cx="0" cy="0"/>
+          <a:chOff x="0" y="0"/>
+          <a:chExt cx="0" cy="0"/>
+        </a:xfrm>
+      </p:grpSpPr>
+      <p:pic>
+        <p:nvPicPr>
+          <p:cNvPr id="8" name="Picture 7"/>
+          <p:cNvPicPr>
+            <a:picLocks noChangeAspect="1"/>
+          </p:cNvPicPr>
+          <p:nvPr/>
+        </p:nvPicPr>
+        <p:blipFill>
+          <a:blip r:embed="rId3">
+            <a:extLst>
+              <a:ext uri="{28A0092B-C50C-407E-A947-70E740481C1C}">
+                <a14:useLocalDpi xmlns:a14="http://schemas.microsoft.com/office/drawing/2010/main" val="0"/>
+              </a:ext>
+            </a:extLst>
+          </a:blip>
+          <a:stretch>
+            <a:fillRect/>
+          </a:stretch>
+        </p:blipFill>
+        <p:spPr>
+          <a:xfrm>
+            <a:off x="8572" y="0"/>
+            <a:ext cx="9126855" cy="6858000"/>
+          </a:xfrm>
+          <a:prstGeom prst="rect">
+            <a:avLst/>
+          </a:prstGeom>
+        </p:spPr>
+      </p:pic>
+      <p:sp>
+        <p:nvSpPr>
+          <p:cNvPr id="5" name="Rectangle 4"/>
+          <p:cNvSpPr/>
+          <p:nvPr/>
+        </p:nvSpPr>
+        <p:spPr>
+          <a:xfrm>
+            <a:off x="1066800" y="685800"/>
+            <a:ext cx="7010400" cy="685800"/>
+          </a:xfrm>
+          <a:prstGeom prst="rect">
+            <a:avLst/>
+          </a:prstGeom>
+          <a:gradFill flip="none" rotWithShape="1">
+            <a:gsLst>
+              <a:gs pos="100000">
+                <a:schemeClr val="bg1">
+                  <a:tint val="90000"/>
+                </a:schemeClr>
+              </a:gs>
+              <a:gs pos="100000">
+                <a:schemeClr val="bg1">
+                  <a:shade val="100000"/>
+                  <a:satMod val="115000"/>
+                </a:schemeClr>
+              </a:gs>
+              <a:gs pos="0">
+                <a:srgbClr val="8390CF"/>
+              </a:gs>
+            </a:gsLst>
+            <a:lin ang="0" scaled="0"/>
+            <a:tileRect/>
+          </a:gradFill>
+          <a:ln>
+            <a:noFill/>
+          </a:ln>
+        </p:spPr>
+        <p:style>
+          <a:lnRef idx="2">
+            <a:schemeClr val="accent1">
+              <a:shade val="50000"/>
+            </a:schemeClr>
+          </a:lnRef>
+          <a:fillRef idx="1">
+            <a:schemeClr val="accent1"/>
+          </a:fillRef>
+          <a:effectRef idx="0">
+            <a:schemeClr val="accent1"/>
+          </a:effectRef>
+          <a:fontRef idx="minor">
+            <a:schemeClr val="lt1"/>
+          </a:fontRef>
+        </p:style>
+        <p:txBody>
+          <a:bodyPr rtlCol="0" anchor="ctr"/>
+          <a:lstStyle/>
+          <a:p>
+            <a:pPr algn="ctr"/>
+            <a:endParaRPr lang="en-US"/>
+          </a:p>
+        </p:txBody>
+      </p:sp>
+      <p:sp>
+        <p:nvSpPr>
+          <p:cNvPr id="4" name="TextBox 3"/>
+          <p:cNvSpPr txBox="1"/>
+          <p:nvPr/>
+        </p:nvSpPr>
+        <p:spPr>
+          <a:xfrm>
+            <a:off x="76200" y="772180"/>
+            <a:ext cx="5791200" cy="523220"/>
+          </a:xfrm>
+          <a:prstGeom prst="rect">
+            <a:avLst/>
+          </a:prstGeom>
+          <a:noFill/>
+        </p:spPr>
+        <p:txBody>
+          <a:bodyPr wrap="square" rtlCol="0">
+            <a:spAutoFit/>
+          </a:bodyPr>
+          <a:lstStyle/>
+          <a:p>
+            <a:r>
+              <a:rPr lang="en-US" sz="2800" dirty="0" smtClean="0"/>
+              <a:t>Problems Encountered</a:t>
+            </a:r>
+            <a:endParaRPr lang="en-US" sz="2800" dirty="0"/>
+          </a:p>
+        </p:txBody>
+      </p:sp>
+      <p:sp>
+        <p:nvSpPr>
+          <p:cNvPr id="6" name="TextBox 5"/>
+          <p:cNvSpPr txBox="1"/>
+          <p:nvPr/>
+        </p:nvSpPr>
+        <p:spPr>
+          <a:xfrm>
+            <a:off x="0" y="1404878"/>
+            <a:ext cx="2514600" cy="954107"/>
+          </a:xfrm>
+          <a:prstGeom prst="rect">
+            <a:avLst/>
+          </a:prstGeom>
+          <a:noFill/>
+        </p:spPr>
+        <p:txBody>
+          <a:bodyPr wrap="square" rtlCol="0">
+            <a:spAutoFit/>
+          </a:bodyPr>
+          <a:lstStyle/>
+          <a:p>
+            <a:r>
+              <a:rPr lang="en-US" sz="1400" dirty="0" smtClean="0">
+                <a:solidFill>
+                  <a:schemeClr val="bg1"/>
+                </a:solidFill>
+              </a:rPr>
+              <a:t>Lessons</a:t>
+            </a:r>
+          </a:p>
+          <a:p>
+            <a:r>
+              <a:rPr lang="en-US" sz="1400" dirty="0" smtClean="0">
+                <a:solidFill>
+                  <a:schemeClr val="bg1"/>
+                </a:solidFill>
+              </a:rPr>
+              <a:t>Robot</a:t>
+            </a:r>
+          </a:p>
+          <a:p>
+            <a:r>
+              <a:rPr lang="en-US" sz="1400" dirty="0" smtClean="0">
+                <a:solidFill>
+                  <a:schemeClr val="bg1"/>
+                </a:solidFill>
+              </a:rPr>
+              <a:t>Suggestions</a:t>
+            </a:r>
+          </a:p>
+          <a:p>
+            <a:r>
+              <a:rPr lang="en-US" sz="1400" dirty="0" smtClean="0">
+                <a:solidFill>
+                  <a:schemeClr val="bg1"/>
+                </a:solidFill>
+              </a:rPr>
+              <a:t>Conclusion</a:t>
+            </a:r>
+            <a:endParaRPr lang="en-US" sz="1400" dirty="0">
+              <a:solidFill>
+                <a:schemeClr val="bg1"/>
+              </a:solidFill>
+            </a:endParaRPr>
+          </a:p>
+        </p:txBody>
+      </p:sp>
+      <p:sp>
+        <p:nvSpPr>
+          <p:cNvPr id="7" name="TextBox 6"/>
+          <p:cNvSpPr txBox="1"/>
+          <p:nvPr/>
+        </p:nvSpPr>
+        <p:spPr>
+          <a:xfrm>
+            <a:off x="0" y="-39707"/>
+            <a:ext cx="2514600" cy="954107"/>
+          </a:xfrm>
+          <a:prstGeom prst="rect">
+            <a:avLst/>
+          </a:prstGeom>
+          <a:noFill/>
+        </p:spPr>
+        <p:txBody>
+          <a:bodyPr wrap="square" rtlCol="0">
+            <a:spAutoFit/>
+          </a:bodyPr>
+          <a:lstStyle/>
+          <a:p>
+            <a:r>
+              <a:rPr lang="en-US" sz="1400" dirty="0">
+                <a:solidFill>
+                  <a:schemeClr val="bg1">
+                    <a:lumMod val="75000"/>
+                  </a:schemeClr>
+                </a:solidFill>
+              </a:rPr>
+              <a:t>Controls</a:t>
+            </a:r>
+          </a:p>
+          <a:p>
+            <a:r>
+              <a:rPr lang="en-US" sz="1400" dirty="0">
+                <a:solidFill>
+                  <a:schemeClr val="bg1">
+                    <a:lumMod val="75000"/>
+                  </a:schemeClr>
+                </a:solidFill>
+              </a:rPr>
+              <a:t>Code</a:t>
+            </a:r>
+          </a:p>
+          <a:p>
+            <a:r>
+              <a:rPr lang="en-US" sz="1400" dirty="0">
+                <a:solidFill>
+                  <a:schemeClr val="bg1">
+                    <a:lumMod val="75000"/>
+                  </a:schemeClr>
+                </a:solidFill>
+              </a:rPr>
+              <a:t>Testing</a:t>
+            </a:r>
+          </a:p>
+          <a:p>
+            <a:endParaRPr lang="en-US" sz="1400" dirty="0">
+              <a:solidFill>
+                <a:schemeClr val="bg1">
+                  <a:lumMod val="75000"/>
+                </a:schemeClr>
+              </a:solidFill>
+            </a:endParaRPr>
+          </a:p>
+        </p:txBody>
+      </p:sp>
+    </p:spTree>
+    <p:extLst>
+      <p:ext uri="{BB962C8B-B14F-4D97-AF65-F5344CB8AC3E}">
+        <p14:creationId xmlns:p14="http://schemas.microsoft.com/office/powerpoint/2010/main" val="3683755532"/>
+      </p:ext>
+    </p:extLst>
+  </p:cSld>
+  <p:clrMapOvr>
+    <a:masterClrMapping/>
+  </p:clrMapOvr>
+  <mc:AlternateContent xmlns:mc="http://schemas.openxmlformats.org/markup-compatibility/2006" xmlns:p14="http://schemas.microsoft.com/office/powerpoint/2010/main">
+    <mc:Choice Requires="p14">
+      <p:transition spd="slow" p14:dur="2000"/>
+    </mc:Choice>
+    <mc:Fallback xmlns="">
+      <p:transition spd="slow"/>
+    </mc:Fallback>
+  </mc:AlternateContent>
+  <p:timing>
+    <p:tnLst>
+      <p:par>
+        <p:cTn id="1" dur="indefinite" restart="never" nodeType="tmRoot"/>
+      </p:par>
+    </p:tnLst>
+  </p:timing>
+</p:sld>
+</file>
+
+<file path=ppt/slides/slide12.xml><?xml version="1.0" encoding="utf-8"?>
+<p:sld xmlns:a="http://schemas.openxmlformats.org/drawingml/2006/main" xmlns:r="http://schemas.openxmlformats.org/officeDocument/2006/relationships" xmlns:p="http://schemas.openxmlformats.org/presentationml/2006/main">
+  <p:cSld>
     <p:bg>
       <p:bgPr>
         <a:gradFill rotWithShape="1">
@@ -5402,7 +6224,7 @@
 </p:sld>
 </file>
 
-<file path=ppt/slides/slide11.xml><?xml version="1.0" encoding="utf-8"?>
+<file path=ppt/slides/slide13.xml><?xml version="1.0" encoding="utf-8"?>
 <p:sld xmlns:a="http://schemas.openxmlformats.org/drawingml/2006/main" xmlns:r="http://schemas.openxmlformats.org/officeDocument/2006/relationships" xmlns:p="http://schemas.openxmlformats.org/presentationml/2006/main">
   <p:cSld>
     <p:spTree>
@@ -5678,7 +6500,7 @@
 </p:sld>
 </file>
 
-<file path=ppt/slides/slide12.xml><?xml version="1.0" encoding="utf-8"?>
+<file path=ppt/slides/slide14.xml><?xml version="1.0" encoding="utf-8"?>
 <p:sld xmlns:a="http://schemas.openxmlformats.org/drawingml/2006/main" xmlns:r="http://schemas.openxmlformats.org/officeDocument/2006/relationships" xmlns:p="http://schemas.openxmlformats.org/presentationml/2006/main">
   <p:cSld>
     <p:spTree>
@@ -5952,7 +6774,7 @@
 </p:sld>
 </file>
 
-<file path=ppt/slides/slide13.xml><?xml version="1.0" encoding="utf-8"?>
+<file path=ppt/slides/slide15.xml><?xml version="1.0" encoding="utf-8"?>
 <p:sld xmlns:a="http://schemas.openxmlformats.org/drawingml/2006/main" xmlns:r="http://schemas.openxmlformats.org/officeDocument/2006/relationships" xmlns:p="http://schemas.openxmlformats.org/presentationml/2006/main">
   <p:cSld>
     <p:spTree>
@@ -6758,11 +7580,7 @@
           <a:p>
             <a:r>
               <a:rPr lang="en-US" sz="2800" dirty="0" smtClean="0"/>
-              <a:t>Recap of </a:t>
-            </a:r>
-            <a:r>
-              <a:rPr lang="en-US" sz="2800" dirty="0" smtClean="0"/>
-              <a:t>Fall</a:t>
+              <a:t>Recap of Fall</a:t>
             </a:r>
             <a:endParaRPr lang="en-US" sz="2800" dirty="0"/>
           </a:p>
@@ -7190,11 +8008,7 @@
           <a:p>
             <a:r>
               <a:rPr lang="en-US" sz="2800" dirty="0" smtClean="0"/>
-              <a:t>Recap of </a:t>
-            </a:r>
-            <a:r>
-              <a:rPr lang="en-US" sz="2800" dirty="0" smtClean="0"/>
-              <a:t>Fall</a:t>
+              <a:t>Recap of Fall</a:t>
             </a:r>
             <a:endParaRPr lang="en-US" sz="2800" dirty="0"/>
           </a:p>
@@ -7565,11 +8379,7 @@
           <a:p>
             <a:r>
               <a:rPr lang="en-US" sz="2800" dirty="0" smtClean="0"/>
-              <a:t>Recap of </a:t>
-            </a:r>
-            <a:r>
-              <a:rPr lang="en-US" sz="2800" dirty="0" smtClean="0"/>
-              <a:t>Winter</a:t>
+              <a:t>Recap of Winter</a:t>
             </a:r>
             <a:endParaRPr lang="en-US" sz="2800" dirty="0"/>
           </a:p>
@@ -8026,7 +8836,7 @@
         <p:spPr>
           <a:xfrm>
             <a:off x="76200" y="772180"/>
-            <a:ext cx="5791200" cy="523220"/>
+            <a:ext cx="7772400" cy="523220"/>
           </a:xfrm>
           <a:prstGeom prst="rect">
             <a:avLst/>
@@ -8041,7 +8851,11 @@
           <a:p>
             <a:r>
               <a:rPr lang="en-US" sz="2800" dirty="0" smtClean="0"/>
-              <a:t>Control System</a:t>
+              <a:t>Control </a:t>
+            </a:r>
+            <a:r>
+              <a:rPr lang="en-US" sz="2800" dirty="0" smtClean="0"/>
+              <a:t>System – Closed Loop System Overview</a:t>
             </a:r>
             <a:endParaRPr lang="en-US" sz="2800" dirty="0"/>
           </a:p>
@@ -8210,6 +9024,111 @@
           </a:p>
         </p:txBody>
       </p:sp>
+      <p:sp>
+        <p:nvSpPr>
+          <p:cNvPr id="2" name="TextBox 1"/>
+          <p:cNvSpPr txBox="1"/>
+          <p:nvPr/>
+        </p:nvSpPr>
+        <p:spPr>
+          <a:xfrm>
+            <a:off x="1243189" y="5593644"/>
+            <a:ext cx="7658100" cy="1015663"/>
+          </a:xfrm>
+          <a:prstGeom prst="rect">
+            <a:avLst/>
+          </a:prstGeom>
+          <a:noFill/>
+        </p:spPr>
+        <p:txBody>
+          <a:bodyPr wrap="square" rtlCol="0">
+            <a:spAutoFit/>
+          </a:bodyPr>
+          <a:lstStyle/>
+          <a:p>
+            <a:pPr marL="228600" indent="-228600">
+              <a:buAutoNum type="arabicPeriod"/>
+            </a:pPr>
+            <a:r>
+              <a:rPr lang="en-US" sz="1200" dirty="0" smtClean="0"/>
+              <a:t>This is the closed-loop system controller layout for the entire system. The state feedback controller sets the control efforts which affect the torque being applied to the  motors. The changes in torque change the state-space model. Changes detected by the IMU allow the controller to compute new gains.</a:t>
+            </a:r>
+          </a:p>
+          <a:p>
+            <a:pPr marL="228600" indent="-228600">
+              <a:buAutoNum type="arabicPeriod"/>
+            </a:pPr>
+            <a:r>
+              <a:rPr lang="en-US" sz="1200" dirty="0" smtClean="0"/>
+              <a:t>The user can select the type of controller: Linear Quadratic Regulator or Ackermann pole placement.</a:t>
+            </a:r>
+          </a:p>
+          <a:p>
+            <a:pPr marL="228600" indent="-228600">
+              <a:buAutoNum type="arabicPeriod"/>
+            </a:pPr>
+            <a:r>
+              <a:rPr lang="en-US" sz="1200" dirty="0" smtClean="0"/>
+              <a:t>The pole locations of the state machine controller are then displayed for user purposes.</a:t>
+            </a:r>
+            <a:endParaRPr lang="en-US" sz="1200" dirty="0"/>
+          </a:p>
+        </p:txBody>
+      </p:sp>
+      <p:pic>
+        <p:nvPicPr>
+          <p:cNvPr id="1027" name="Picture 3"/>
+          <p:cNvPicPr>
+            <a:picLocks noChangeAspect="1" noChangeArrowheads="1"/>
+          </p:cNvPicPr>
+          <p:nvPr/>
+        </p:nvPicPr>
+        <p:blipFill>
+          <a:blip r:embed="rId4">
+            <a:extLst>
+              <a:ext uri="{28A0092B-C50C-407E-A947-70E740481C1C}">
+                <a14:useLocalDpi xmlns:a14="http://schemas.microsoft.com/office/drawing/2010/main" val="0"/>
+              </a:ext>
+            </a:extLst>
+          </a:blip>
+          <a:srcRect/>
+          <a:stretch>
+            <a:fillRect/>
+          </a:stretch>
+        </p:blipFill>
+        <p:spPr bwMode="auto">
+          <a:xfrm>
+            <a:off x="2073095" y="1440350"/>
+            <a:ext cx="5470705" cy="4122250"/>
+          </a:xfrm>
+          <a:prstGeom prst="rect">
+            <a:avLst/>
+          </a:prstGeom>
+          <a:noFill/>
+          <a:ln>
+            <a:noFill/>
+          </a:ln>
+          <a:extLst>
+            <a:ext uri="{909E8E84-426E-40DD-AFC4-6F175D3DCCD1}">
+              <a14:hiddenFill xmlns:a14="http://schemas.microsoft.com/office/drawing/2010/main">
+                <a:solidFill>
+                  <a:schemeClr val="accent1"/>
+                </a:solidFill>
+              </a14:hiddenFill>
+            </a:ext>
+            <a:ext uri="{91240B29-F687-4F45-9708-019B960494DF}">
+              <a14:hiddenLine xmlns:a14="http://schemas.microsoft.com/office/drawing/2010/main" w="9525">
+                <a:solidFill>
+                  <a:schemeClr val="tx1"/>
+                </a:solidFill>
+                <a:miter lim="800000"/>
+                <a:headEnd/>
+                <a:tailEnd/>
+              </a14:hiddenLine>
+            </a:ext>
+          </a:extLst>
+        </p:spPr>
+      </p:pic>
     </p:spTree>
     <p:extLst>
       <p:ext uri="{BB962C8B-B14F-4D97-AF65-F5344CB8AC3E}">
@@ -8269,7 +9188,7 @@
         </p:blipFill>
         <p:spPr>
           <a:xfrm>
-            <a:off x="8572" y="0"/>
+            <a:off x="34078" y="76200"/>
             <a:ext cx="9126855" cy="6858000"/>
           </a:xfrm>
           <a:prstGeom prst="rect">
@@ -8349,7 +9268,7 @@
         <p:spPr>
           <a:xfrm>
             <a:off x="76200" y="772180"/>
-            <a:ext cx="5791200" cy="523220"/>
+            <a:ext cx="6400800" cy="523220"/>
           </a:xfrm>
           <a:prstGeom prst="rect">
             <a:avLst/>
@@ -8364,7 +9283,11 @@
           <a:p>
             <a:r>
               <a:rPr lang="en-US" sz="2800" dirty="0" smtClean="0"/>
-              <a:t>Code</a:t>
+              <a:t>Control </a:t>
+            </a:r>
+            <a:r>
+              <a:rPr lang="en-US" sz="2800" dirty="0" smtClean="0"/>
+              <a:t>System – Controller Approaches</a:t>
             </a:r>
             <a:endParaRPr lang="en-US" sz="2800" dirty="0"/>
           </a:p>
@@ -8379,7 +9302,7 @@
         <p:spPr>
           <a:xfrm>
             <a:off x="0" y="1404878"/>
-            <a:ext cx="2514600" cy="1384995"/>
+            <a:ext cx="2514600" cy="1600438"/>
           </a:xfrm>
           <a:prstGeom prst="rect">
             <a:avLst/>
@@ -8391,6 +9314,16 @@
             <a:spAutoFit/>
           </a:bodyPr>
           <a:lstStyle/>
+          <a:p>
+            <a:r>
+              <a:rPr lang="en-US" sz="1400" dirty="0" smtClean="0">
+                <a:solidFill>
+                  <a:schemeClr val="bg1"/>
+                </a:solidFill>
+              </a:rPr>
+              <a:t>Code</a:t>
+            </a:r>
+          </a:p>
           <a:p>
             <a:r>
               <a:rPr lang="en-US" sz="1400" dirty="0" smtClean="0">
@@ -8480,6 +9413,15 @@
           </a:bodyPr>
           <a:lstStyle/>
           <a:p>
+            <a:endParaRPr lang="en-US" sz="1400" dirty="0" smtClean="0">
+              <a:solidFill>
+                <a:schemeClr val="bg1">
+                  <a:lumMod val="75000"/>
+                </a:schemeClr>
+              </a:solidFill>
+            </a:endParaRPr>
+          </a:p>
+          <a:p>
             <a:r>
               <a:rPr lang="en-US" sz="1400" dirty="0">
                 <a:solidFill>
@@ -8501,18 +9443,6 @@
                 </a:solidFill>
               </a:rPr>
               <a:t>Recap</a:t>
-            </a:r>
-          </a:p>
-          <a:p>
-            <a:r>
-              <a:rPr lang="en-US" sz="1400" dirty="0">
-                <a:solidFill>
-                  <a:schemeClr val="bg1">
-                    <a:lumMod val="75000"/>
-                  </a:schemeClr>
-                </a:solidFill>
-              </a:rPr>
-              <a:t>Controls</a:t>
             </a:r>
           </a:p>
           <a:p>
@@ -8526,10 +9456,449 @@
           </a:p>
         </p:txBody>
       </p:sp>
+      <p:sp>
+        <p:nvSpPr>
+          <p:cNvPr id="2" name="TextBox 1"/>
+          <p:cNvSpPr txBox="1"/>
+          <p:nvPr/>
+        </p:nvSpPr>
+        <p:spPr>
+          <a:xfrm>
+            <a:off x="1219200" y="1524000"/>
+            <a:ext cx="2695738" cy="369332"/>
+          </a:xfrm>
+          <a:prstGeom prst="rect">
+            <a:avLst/>
+          </a:prstGeom>
+          <a:noFill/>
+        </p:spPr>
+        <p:txBody>
+          <a:bodyPr wrap="none" rtlCol="0">
+            <a:spAutoFit/>
+          </a:bodyPr>
+          <a:lstStyle/>
+          <a:p>
+            <a:r>
+              <a:rPr lang="en-US" dirty="0" smtClean="0"/>
+              <a:t>Linear Quadratic Regulator</a:t>
+            </a:r>
+            <a:endParaRPr lang="en-US" dirty="0"/>
+          </a:p>
+        </p:txBody>
+      </p:sp>
+      <p:pic>
+        <p:nvPicPr>
+          <p:cNvPr id="2050" name="Picture 2"/>
+          <p:cNvPicPr>
+            <a:picLocks noChangeAspect="1" noChangeArrowheads="1"/>
+          </p:cNvPicPr>
+          <p:nvPr/>
+        </p:nvPicPr>
+        <p:blipFill>
+          <a:blip r:embed="rId4">
+            <a:extLst>
+              <a:ext uri="{28A0092B-C50C-407E-A947-70E740481C1C}">
+                <a14:useLocalDpi xmlns:a14="http://schemas.microsoft.com/office/drawing/2010/main" val="0"/>
+              </a:ext>
+            </a:extLst>
+          </a:blip>
+          <a:srcRect/>
+          <a:stretch>
+            <a:fillRect/>
+          </a:stretch>
+        </p:blipFill>
+        <p:spPr bwMode="auto">
+          <a:xfrm>
+            <a:off x="1247775" y="1972381"/>
+            <a:ext cx="2638425" cy="1476375"/>
+          </a:xfrm>
+          <a:prstGeom prst="rect">
+            <a:avLst/>
+          </a:prstGeom>
+          <a:noFill/>
+          <a:ln>
+            <a:noFill/>
+          </a:ln>
+          <a:extLst>
+            <a:ext uri="{909E8E84-426E-40DD-AFC4-6F175D3DCCD1}">
+              <a14:hiddenFill xmlns:a14="http://schemas.microsoft.com/office/drawing/2010/main">
+                <a:solidFill>
+                  <a:schemeClr val="accent1"/>
+                </a:solidFill>
+              </a14:hiddenFill>
+            </a:ext>
+            <a:ext uri="{91240B29-F687-4F45-9708-019B960494DF}">
+              <a14:hiddenLine xmlns:a14="http://schemas.microsoft.com/office/drawing/2010/main" w="9525">
+                <a:solidFill>
+                  <a:schemeClr val="tx1"/>
+                </a:solidFill>
+                <a:miter lim="800000"/>
+                <a:headEnd/>
+                <a:tailEnd/>
+              </a14:hiddenLine>
+            </a:ext>
+          </a:extLst>
+        </p:spPr>
+      </p:pic>
+      <p:sp>
+        <p:nvSpPr>
+          <p:cNvPr id="3" name="TextBox 2"/>
+          <p:cNvSpPr txBox="1"/>
+          <p:nvPr/>
+        </p:nvSpPr>
+        <p:spPr>
+          <a:xfrm>
+            <a:off x="1219200" y="3733800"/>
+            <a:ext cx="2695738" cy="461665"/>
+          </a:xfrm>
+          <a:prstGeom prst="rect">
+            <a:avLst/>
+          </a:prstGeom>
+          <a:noFill/>
+        </p:spPr>
+        <p:txBody>
+          <a:bodyPr wrap="square" rtlCol="0">
+            <a:spAutoFit/>
+          </a:bodyPr>
+          <a:lstStyle/>
+          <a:p>
+            <a:r>
+              <a:rPr lang="en-US" sz="1200" dirty="0" smtClean="0"/>
+              <a:t>Optimality controller that assigns costs to certain states to prioritize the effort.</a:t>
+            </a:r>
+            <a:endParaRPr lang="en-US" sz="1200" dirty="0"/>
+          </a:p>
+        </p:txBody>
+      </p:sp>
+      <p:sp>
+        <p:nvSpPr>
+          <p:cNvPr id="9" name="TextBox 8"/>
+          <p:cNvSpPr txBox="1"/>
+          <p:nvPr/>
+        </p:nvSpPr>
+        <p:spPr>
+          <a:xfrm>
+            <a:off x="1219200" y="4343400"/>
+            <a:ext cx="2619538" cy="646331"/>
+          </a:xfrm>
+          <a:prstGeom prst="rect">
+            <a:avLst/>
+          </a:prstGeom>
+          <a:noFill/>
+        </p:spPr>
+        <p:txBody>
+          <a:bodyPr wrap="square" rtlCol="0">
+            <a:spAutoFit/>
+          </a:bodyPr>
+          <a:lstStyle/>
+          <a:p>
+            <a:pPr algn="just"/>
+            <a:r>
+              <a:rPr lang="en-US" sz="1200" dirty="0" smtClean="0"/>
+              <a:t>The system must be linearized to assign the costs or weights to the states.</a:t>
+            </a:r>
+            <a:endParaRPr lang="en-US" sz="1200" dirty="0"/>
+          </a:p>
+        </p:txBody>
+      </p:sp>
+      <p:sp>
+        <p:nvSpPr>
+          <p:cNvPr id="10" name="TextBox 9"/>
+          <p:cNvSpPr txBox="1"/>
+          <p:nvPr/>
+        </p:nvSpPr>
+        <p:spPr>
+          <a:xfrm>
+            <a:off x="1219200" y="5257800"/>
+            <a:ext cx="2619538" cy="600164"/>
+          </a:xfrm>
+          <a:prstGeom prst="rect">
+            <a:avLst/>
+          </a:prstGeom>
+          <a:noFill/>
+        </p:spPr>
+        <p:txBody>
+          <a:bodyPr wrap="square" rtlCol="0">
+            <a:spAutoFit/>
+          </a:bodyPr>
+          <a:lstStyle/>
+          <a:p>
+            <a:pPr algn="just"/>
+            <a:r>
+              <a:rPr lang="en-US" sz="1100" dirty="0" smtClean="0"/>
+              <a:t>The Q vector is a square </a:t>
+            </a:r>
+            <a:r>
+              <a:rPr lang="en-US" sz="1100" dirty="0" err="1" smtClean="0"/>
+              <a:t>MxM</a:t>
+            </a:r>
+            <a:r>
+              <a:rPr lang="en-US" sz="1100" dirty="0" smtClean="0"/>
+              <a:t> matrix where M is the total number of states present in the model.</a:t>
+            </a:r>
+            <a:endParaRPr lang="en-US" sz="1100" dirty="0"/>
+          </a:p>
+        </p:txBody>
+      </p:sp>
+      <p:sp>
+        <p:nvSpPr>
+          <p:cNvPr id="11" name="TextBox 10"/>
+          <p:cNvSpPr txBox="1"/>
+          <p:nvPr/>
+        </p:nvSpPr>
+        <p:spPr>
+          <a:xfrm>
+            <a:off x="1219200" y="6019800"/>
+            <a:ext cx="2438400" cy="430887"/>
+          </a:xfrm>
+          <a:prstGeom prst="rect">
+            <a:avLst/>
+          </a:prstGeom>
+          <a:noFill/>
+        </p:spPr>
+        <p:txBody>
+          <a:bodyPr wrap="square" rtlCol="0">
+            <a:spAutoFit/>
+          </a:bodyPr>
+          <a:lstStyle/>
+          <a:p>
+            <a:pPr algn="just"/>
+            <a:r>
+              <a:rPr lang="en-US" sz="1100" dirty="0" smtClean="0"/>
+              <a:t>The R vector is a scalar that multiples to the input of the state-space model.</a:t>
+            </a:r>
+            <a:endParaRPr lang="en-US" sz="1100" dirty="0"/>
+          </a:p>
+        </p:txBody>
+      </p:sp>
+      <p:sp>
+        <p:nvSpPr>
+          <p:cNvPr id="12" name="TextBox 11"/>
+          <p:cNvSpPr txBox="1"/>
+          <p:nvPr/>
+        </p:nvSpPr>
+        <p:spPr>
+          <a:xfrm>
+            <a:off x="5791200" y="1535668"/>
+            <a:ext cx="2743200" cy="369332"/>
+          </a:xfrm>
+          <a:prstGeom prst="rect">
+            <a:avLst/>
+          </a:prstGeom>
+          <a:noFill/>
+        </p:spPr>
+        <p:txBody>
+          <a:bodyPr wrap="square" rtlCol="0">
+            <a:spAutoFit/>
+          </a:bodyPr>
+          <a:lstStyle/>
+          <a:p>
+            <a:r>
+              <a:rPr lang="en-US" dirty="0" smtClean="0"/>
+              <a:t>Ackermann Pole Placement</a:t>
+            </a:r>
+            <a:endParaRPr lang="en-US" dirty="0"/>
+          </a:p>
+        </p:txBody>
+      </p:sp>
+      <p:pic>
+        <p:nvPicPr>
+          <p:cNvPr id="2051" name="Picture 3"/>
+          <p:cNvPicPr>
+            <a:picLocks noChangeAspect="1" noChangeArrowheads="1"/>
+          </p:cNvPicPr>
+          <p:nvPr/>
+        </p:nvPicPr>
+        <p:blipFill>
+          <a:blip r:embed="rId5">
+            <a:extLst>
+              <a:ext uri="{28A0092B-C50C-407E-A947-70E740481C1C}">
+                <a14:useLocalDpi xmlns:a14="http://schemas.microsoft.com/office/drawing/2010/main" val="0"/>
+              </a:ext>
+            </a:extLst>
+          </a:blip>
+          <a:srcRect/>
+          <a:stretch>
+            <a:fillRect/>
+          </a:stretch>
+        </p:blipFill>
+        <p:spPr bwMode="auto">
+          <a:xfrm>
+            <a:off x="5819775" y="1981200"/>
+            <a:ext cx="2638425" cy="1457325"/>
+          </a:xfrm>
+          <a:prstGeom prst="rect">
+            <a:avLst/>
+          </a:prstGeom>
+          <a:noFill/>
+          <a:ln>
+            <a:noFill/>
+          </a:ln>
+          <a:extLst>
+            <a:ext uri="{909E8E84-426E-40DD-AFC4-6F175D3DCCD1}">
+              <a14:hiddenFill xmlns:a14="http://schemas.microsoft.com/office/drawing/2010/main">
+                <a:solidFill>
+                  <a:schemeClr val="accent1"/>
+                </a:solidFill>
+              </a14:hiddenFill>
+            </a:ext>
+            <a:ext uri="{91240B29-F687-4F45-9708-019B960494DF}">
+              <a14:hiddenLine xmlns:a14="http://schemas.microsoft.com/office/drawing/2010/main" w="9525">
+                <a:solidFill>
+                  <a:schemeClr val="tx1"/>
+                </a:solidFill>
+                <a:miter lim="800000"/>
+                <a:headEnd/>
+                <a:tailEnd/>
+              </a14:hiddenLine>
+            </a:ext>
+          </a:extLst>
+        </p:spPr>
+      </p:pic>
+      <p:sp>
+        <p:nvSpPr>
+          <p:cNvPr id="15" name="TextBox 14"/>
+          <p:cNvSpPr txBox="1"/>
+          <p:nvPr/>
+        </p:nvSpPr>
+        <p:spPr>
+          <a:xfrm>
+            <a:off x="5867400" y="3729335"/>
+            <a:ext cx="2695738" cy="646331"/>
+          </a:xfrm>
+          <a:prstGeom prst="rect">
+            <a:avLst/>
+          </a:prstGeom>
+          <a:noFill/>
+        </p:spPr>
+        <p:txBody>
+          <a:bodyPr wrap="square" rtlCol="0">
+            <a:spAutoFit/>
+          </a:bodyPr>
+          <a:lstStyle/>
+          <a:p>
+            <a:pPr algn="just"/>
+            <a:r>
+              <a:rPr lang="en-US" sz="1200" dirty="0" smtClean="0"/>
+              <a:t>An </a:t>
+            </a:r>
+            <a:r>
+              <a:rPr lang="en-US" sz="1200" dirty="0"/>
+              <a:t>approach that allows us to identify the controllability matrix assuming that the system is controllable</a:t>
+            </a:r>
+            <a:endParaRPr lang="en-US" sz="1200" dirty="0"/>
+          </a:p>
+        </p:txBody>
+      </p:sp>
+      <p:sp>
+        <p:nvSpPr>
+          <p:cNvPr id="17" name="TextBox 16"/>
+          <p:cNvSpPr txBox="1"/>
+          <p:nvPr/>
+        </p:nvSpPr>
+        <p:spPr>
+          <a:xfrm>
+            <a:off x="5867400" y="4495800"/>
+            <a:ext cx="2619538" cy="646331"/>
+          </a:xfrm>
+          <a:prstGeom prst="rect">
+            <a:avLst/>
+          </a:prstGeom>
+          <a:noFill/>
+        </p:spPr>
+        <p:txBody>
+          <a:bodyPr wrap="square" rtlCol="0">
+            <a:spAutoFit/>
+          </a:bodyPr>
+          <a:lstStyle/>
+          <a:p>
+            <a:pPr algn="just"/>
+            <a:r>
+              <a:rPr lang="en-US" sz="1200" dirty="0"/>
+              <a:t>T</a:t>
+            </a:r>
+            <a:r>
+              <a:rPr lang="en-US" sz="1200" dirty="0" smtClean="0"/>
+              <a:t>he </a:t>
+            </a:r>
+            <a:r>
+              <a:rPr lang="en-US" sz="1200" dirty="0"/>
+              <a:t>state-feedback gain matrix can then </a:t>
+            </a:r>
+            <a:r>
+              <a:rPr lang="en-US" sz="1200" dirty="0" smtClean="0"/>
+              <a:t>found after identifying the controllability matrix.</a:t>
+            </a:r>
+            <a:endParaRPr lang="en-US" sz="1200" dirty="0"/>
+          </a:p>
+        </p:txBody>
+      </p:sp>
+      <p:sp>
+        <p:nvSpPr>
+          <p:cNvPr id="18" name="TextBox 17"/>
+          <p:cNvSpPr txBox="1"/>
+          <p:nvPr/>
+        </p:nvSpPr>
+        <p:spPr>
+          <a:xfrm>
+            <a:off x="5867400" y="5257800"/>
+            <a:ext cx="2619538" cy="600164"/>
+          </a:xfrm>
+          <a:prstGeom prst="rect">
+            <a:avLst/>
+          </a:prstGeom>
+          <a:noFill/>
+        </p:spPr>
+        <p:txBody>
+          <a:bodyPr wrap="square" rtlCol="0">
+            <a:spAutoFit/>
+          </a:bodyPr>
+          <a:lstStyle/>
+          <a:p>
+            <a:pPr algn="just"/>
+            <a:r>
+              <a:rPr lang="en-US" sz="1100" dirty="0" smtClean="0"/>
+              <a:t>The user has to preset the desired system poles and pass in a discretized system model.</a:t>
+            </a:r>
+            <a:endParaRPr lang="en-US" sz="1100" dirty="0"/>
+          </a:p>
+        </p:txBody>
+      </p:sp>
+      <p:sp>
+        <p:nvSpPr>
+          <p:cNvPr id="19" name="TextBox 18"/>
+          <p:cNvSpPr txBox="1"/>
+          <p:nvPr/>
+        </p:nvSpPr>
+        <p:spPr>
+          <a:xfrm>
+            <a:off x="5867400" y="6019800"/>
+            <a:ext cx="2438400" cy="430887"/>
+          </a:xfrm>
+          <a:prstGeom prst="rect">
+            <a:avLst/>
+          </a:prstGeom>
+          <a:noFill/>
+        </p:spPr>
+        <p:txBody>
+          <a:bodyPr wrap="square" rtlCol="0">
+            <a:spAutoFit/>
+          </a:bodyPr>
+          <a:lstStyle/>
+          <a:p>
+            <a:pPr algn="just"/>
+            <a:r>
+              <a:rPr lang="en-US" sz="1100" dirty="0" smtClean="0"/>
+              <a:t>The controller determines the gains to placed the poles at the desired location</a:t>
+            </a:r>
+            <a:endParaRPr lang="en-US" sz="1100" dirty="0"/>
+          </a:p>
+        </p:txBody>
+      </p:sp>
     </p:spTree>
     <p:extLst>
       <p:ext uri="{BB962C8B-B14F-4D97-AF65-F5344CB8AC3E}">
-        <p14:creationId xmlns:p14="http://schemas.microsoft.com/office/powerpoint/2010/main" val="3838835561"/>
+        <p14:creationId xmlns:p14="http://schemas.microsoft.com/office/powerpoint/2010/main" val="2752343373"/>
       </p:ext>
     </p:extLst>
   </p:cSld>
@@ -8680,7 +10049,11 @@
           <a:p>
             <a:r>
               <a:rPr lang="en-US" sz="2800" dirty="0" smtClean="0"/>
-              <a:t>Testing Plan</a:t>
+              <a:t>Control </a:t>
+            </a:r>
+            <a:r>
+              <a:rPr lang="en-US" sz="2800" dirty="0" smtClean="0"/>
+              <a:t>System – Analysis in LabVIEW</a:t>
             </a:r>
             <a:endParaRPr lang="en-US" sz="2800" dirty="0"/>
           </a:p>
@@ -8695,7 +10068,7 @@
         <p:spPr>
           <a:xfrm>
             <a:off x="0" y="1404878"/>
-            <a:ext cx="2514600" cy="1169551"/>
+            <a:ext cx="2514600" cy="1600438"/>
           </a:xfrm>
           <a:prstGeom prst="rect">
             <a:avLst/>
@@ -8707,6 +10080,26 @@
             <a:spAutoFit/>
           </a:bodyPr>
           <a:lstStyle/>
+          <a:p>
+            <a:r>
+              <a:rPr lang="en-US" sz="1400" dirty="0" smtClean="0">
+                <a:solidFill>
+                  <a:schemeClr val="bg1"/>
+                </a:solidFill>
+              </a:rPr>
+              <a:t>Code</a:t>
+            </a:r>
+          </a:p>
+          <a:p>
+            <a:r>
+              <a:rPr lang="en-US" sz="1400" dirty="0" smtClean="0">
+                <a:solidFill>
+                  <a:schemeClr val="bg1"/>
+                </a:solidFill>
+              </a:rPr>
+              <a:t>Testing</a:t>
+            </a:r>
+          </a:p>
           <a:p>
             <a:r>
               <a:rPr lang="en-US" sz="1400" dirty="0" smtClean="0">
@@ -8786,6 +10179,15 @@
           </a:bodyPr>
           <a:lstStyle/>
           <a:p>
+            <a:endParaRPr lang="en-US" sz="1400" dirty="0" smtClean="0">
+              <a:solidFill>
+                <a:schemeClr val="bg1">
+                  <a:lumMod val="75000"/>
+                </a:schemeClr>
+              </a:solidFill>
+            </a:endParaRPr>
+          </a:p>
+          <a:p>
             <a:r>
               <a:rPr lang="en-US" sz="1400" dirty="0">
                 <a:solidFill>
@@ -8794,7 +10196,7 @@
                   </a:schemeClr>
                 </a:solidFill>
               </a:rPr>
-              <a:t>Recap</a:t>
+              <a:t>Introduction</a:t>
             </a:r>
           </a:p>
           <a:p>
@@ -8806,19 +10208,7 @@
                   </a:schemeClr>
                 </a:solidFill>
               </a:rPr>
-              <a:t>Controls</a:t>
-            </a:r>
-          </a:p>
-          <a:p>
-            <a:r>
-              <a:rPr lang="en-US" sz="1400" dirty="0">
-                <a:solidFill>
-                  <a:schemeClr val="bg1">
-                    <a:lumMod val="75000"/>
-                  </a:schemeClr>
-                </a:solidFill>
-              </a:rPr>
-              <a:t>Code</a:t>
+              <a:t>Recap</a:t>
             </a:r>
           </a:p>
           <a:p>
@@ -8832,10 +10222,219 @@
           </a:p>
         </p:txBody>
       </p:sp>
+      <p:pic>
+        <p:nvPicPr>
+          <p:cNvPr id="3075" name="Picture 3"/>
+          <p:cNvPicPr>
+            <a:picLocks noChangeAspect="1" noChangeArrowheads="1"/>
+          </p:cNvPicPr>
+          <p:nvPr/>
+        </p:nvPicPr>
+        <p:blipFill>
+          <a:blip r:embed="rId4" cstate="print">
+            <a:extLst>
+              <a:ext uri="{28A0092B-C50C-407E-A947-70E740481C1C}">
+                <a14:useLocalDpi xmlns:a14="http://schemas.microsoft.com/office/drawing/2010/main" val="0"/>
+              </a:ext>
+            </a:extLst>
+          </a:blip>
+          <a:srcRect/>
+          <a:stretch>
+            <a:fillRect/>
+          </a:stretch>
+        </p:blipFill>
+        <p:spPr bwMode="auto">
+          <a:xfrm>
+            <a:off x="1219200" y="1447800"/>
+            <a:ext cx="3873909" cy="2658012"/>
+          </a:xfrm>
+          <a:prstGeom prst="rect">
+            <a:avLst/>
+          </a:prstGeom>
+          <a:noFill/>
+          <a:ln>
+            <a:noFill/>
+          </a:ln>
+          <a:extLst>
+            <a:ext uri="{909E8E84-426E-40DD-AFC4-6F175D3DCCD1}">
+              <a14:hiddenFill xmlns:a14="http://schemas.microsoft.com/office/drawing/2010/main">
+                <a:solidFill>
+                  <a:schemeClr val="accent1"/>
+                </a:solidFill>
+              </a14:hiddenFill>
+            </a:ext>
+            <a:ext uri="{91240B29-F687-4F45-9708-019B960494DF}">
+              <a14:hiddenLine xmlns:a14="http://schemas.microsoft.com/office/drawing/2010/main" w="9525">
+                <a:solidFill>
+                  <a:schemeClr val="tx1"/>
+                </a:solidFill>
+                <a:miter lim="800000"/>
+                <a:headEnd/>
+                <a:tailEnd/>
+              </a14:hiddenLine>
+            </a:ext>
+          </a:extLst>
+        </p:spPr>
+      </p:pic>
+      <p:pic>
+        <p:nvPicPr>
+          <p:cNvPr id="3076" name="Picture 4"/>
+          <p:cNvPicPr>
+            <a:picLocks noChangeAspect="1" noChangeArrowheads="1"/>
+          </p:cNvPicPr>
+          <p:nvPr/>
+        </p:nvPicPr>
+        <p:blipFill>
+          <a:blip r:embed="rId5" cstate="print">
+            <a:extLst>
+              <a:ext uri="{28A0092B-C50C-407E-A947-70E740481C1C}">
+                <a14:useLocalDpi xmlns:a14="http://schemas.microsoft.com/office/drawing/2010/main" val="0"/>
+              </a:ext>
+            </a:extLst>
+          </a:blip>
+          <a:srcRect/>
+          <a:stretch>
+            <a:fillRect/>
+          </a:stretch>
+        </p:blipFill>
+        <p:spPr bwMode="auto">
+          <a:xfrm>
+            <a:off x="1143000" y="4137745"/>
+            <a:ext cx="4230489" cy="2644055"/>
+          </a:xfrm>
+          <a:prstGeom prst="rect">
+            <a:avLst/>
+          </a:prstGeom>
+          <a:noFill/>
+          <a:ln>
+            <a:noFill/>
+          </a:ln>
+          <a:extLst>
+            <a:ext uri="{909E8E84-426E-40DD-AFC4-6F175D3DCCD1}">
+              <a14:hiddenFill xmlns:a14="http://schemas.microsoft.com/office/drawing/2010/main">
+                <a:solidFill>
+                  <a:schemeClr val="accent1"/>
+                </a:solidFill>
+              </a14:hiddenFill>
+            </a:ext>
+            <a:ext uri="{91240B29-F687-4F45-9708-019B960494DF}">
+              <a14:hiddenLine xmlns:a14="http://schemas.microsoft.com/office/drawing/2010/main" w="9525">
+                <a:solidFill>
+                  <a:schemeClr val="tx1"/>
+                </a:solidFill>
+                <a:miter lim="800000"/>
+                <a:headEnd/>
+                <a:tailEnd/>
+              </a14:hiddenLine>
+            </a:ext>
+          </a:extLst>
+        </p:spPr>
+      </p:pic>
+      <p:sp>
+        <p:nvSpPr>
+          <p:cNvPr id="2" name="TextBox 1"/>
+          <p:cNvSpPr txBox="1"/>
+          <p:nvPr/>
+        </p:nvSpPr>
+        <p:spPr>
+          <a:xfrm>
+            <a:off x="5638800" y="1752600"/>
+            <a:ext cx="3124200" cy="1785104"/>
+          </a:xfrm>
+          <a:prstGeom prst="rect">
+            <a:avLst/>
+          </a:prstGeom>
+          <a:noFill/>
+        </p:spPr>
+        <p:txBody>
+          <a:bodyPr wrap="square" rtlCol="0">
+            <a:spAutoFit/>
+          </a:bodyPr>
+          <a:lstStyle/>
+          <a:p>
+            <a:pPr marL="228600" indent="-228600">
+              <a:buAutoNum type="arabicPeriod"/>
+            </a:pPr>
+            <a:r>
+              <a:rPr lang="en-US" sz="1100" dirty="0" smtClean="0"/>
+              <a:t>Displays the settling time of a controllable system.</a:t>
+            </a:r>
+          </a:p>
+          <a:p>
+            <a:pPr marL="228600" indent="-228600">
+              <a:buAutoNum type="arabicPeriod"/>
+            </a:pPr>
+            <a:r>
+              <a:rPr lang="en-US" sz="1100" dirty="0" smtClean="0"/>
+              <a:t>Displays whether the system can reach stability or not.</a:t>
+            </a:r>
+          </a:p>
+          <a:p>
+            <a:pPr marL="228600" indent="-228600">
+              <a:buAutoNum type="arabicPeriod"/>
+            </a:pPr>
+            <a:r>
+              <a:rPr lang="en-US" sz="1100" dirty="0" smtClean="0"/>
+              <a:t>Displays the impulse response of the controller. This can be used to determined if the system can reach a steady-state response.</a:t>
+            </a:r>
+          </a:p>
+          <a:p>
+            <a:pPr marL="228600" indent="-228600">
+              <a:buAutoNum type="arabicPeriod"/>
+            </a:pPr>
+            <a:r>
+              <a:rPr lang="en-US" sz="1100" dirty="0" smtClean="0"/>
+              <a:t>The user can see the Bode plots for the calculated system poles of the closed-loop transfer function.</a:t>
+            </a:r>
+            <a:endParaRPr lang="en-US" sz="1100" dirty="0"/>
+          </a:p>
+        </p:txBody>
+      </p:sp>
+      <p:sp>
+        <p:nvSpPr>
+          <p:cNvPr id="3" name="TextBox 2"/>
+          <p:cNvSpPr txBox="1"/>
+          <p:nvPr/>
+        </p:nvSpPr>
+        <p:spPr>
+          <a:xfrm>
+            <a:off x="5715000" y="4724400"/>
+            <a:ext cx="3276600" cy="1277273"/>
+          </a:xfrm>
+          <a:prstGeom prst="rect">
+            <a:avLst/>
+          </a:prstGeom>
+          <a:noFill/>
+        </p:spPr>
+        <p:txBody>
+          <a:bodyPr wrap="square" rtlCol="0">
+            <a:spAutoFit/>
+          </a:bodyPr>
+          <a:lstStyle/>
+          <a:p>
+            <a:r>
+              <a:rPr lang="en-US" sz="1100" dirty="0" smtClean="0"/>
+              <a:t>5. The user can see the  real-time status of the state machine controller.</a:t>
+            </a:r>
+          </a:p>
+          <a:p>
+            <a:r>
+              <a:rPr lang="en-US" sz="1100" dirty="0" smtClean="0"/>
+              <a:t>6. The system was given a user-friendly visualization for behavioral responses.</a:t>
+            </a:r>
+          </a:p>
+          <a:p>
+            <a:r>
+              <a:rPr lang="en-US" sz="1100" dirty="0" smtClean="0"/>
+              <a:t>7. The user can monitor the status of the states and the control signal that sets the motor speeds and directions.</a:t>
+            </a:r>
+          </a:p>
+        </p:txBody>
+      </p:sp>
     </p:spTree>
     <p:extLst>
       <p:ext uri="{BB962C8B-B14F-4D97-AF65-F5344CB8AC3E}">
-        <p14:creationId xmlns:p14="http://schemas.microsoft.com/office/powerpoint/2010/main" val="4110614398"/>
+        <p14:creationId xmlns:p14="http://schemas.microsoft.com/office/powerpoint/2010/main" val="2752343373"/>
       </p:ext>
     </p:extLst>
   </p:cSld>
@@ -8986,7 +10585,7 @@
           <a:p>
             <a:r>
               <a:rPr lang="en-US" sz="2800" dirty="0" smtClean="0"/>
-              <a:t>Problems Encountered</a:t>
+              <a:t>Code</a:t>
             </a:r>
             <a:endParaRPr lang="en-US" sz="2800" dirty="0"/>
           </a:p>
@@ -9001,7 +10600,7 @@
         <p:spPr>
           <a:xfrm>
             <a:off x="0" y="1404878"/>
-            <a:ext cx="2514600" cy="954107"/>
+            <a:ext cx="2514600" cy="1384995"/>
           </a:xfrm>
           <a:prstGeom prst="rect">
             <a:avLst/>
@@ -9013,6 +10612,26 @@
             <a:spAutoFit/>
           </a:bodyPr>
           <a:lstStyle/>
+          <a:p>
+            <a:r>
+              <a:rPr lang="en-US" sz="1400" dirty="0" smtClean="0">
+                <a:solidFill>
+                  <a:schemeClr val="bg1"/>
+                </a:solidFill>
+              </a:rPr>
+              <a:t>Testing</a:t>
+            </a:r>
+          </a:p>
+          <a:p>
+            <a:r>
+              <a:rPr lang="en-US" sz="1400" dirty="0" smtClean="0">
+                <a:solidFill>
+                  <a:schemeClr val="bg1"/>
+                </a:solidFill>
+              </a:rPr>
+              <a:t>Problems</a:t>
+            </a:r>
+          </a:p>
           <a:p>
             <a:r>
               <a:rPr lang="en-US" sz="1400" dirty="0" smtClean="0">
@@ -9090,7 +10709,7 @@
                   </a:schemeClr>
                 </a:solidFill>
               </a:rPr>
-              <a:t>Controls</a:t>
+              <a:t>Introduction</a:t>
             </a:r>
           </a:p>
           <a:p>
@@ -9102,7 +10721,7 @@
                   </a:schemeClr>
                 </a:solidFill>
               </a:rPr>
-              <a:t>Code</a:t>
+              <a:t>Recap</a:t>
             </a:r>
           </a:p>
           <a:p>
@@ -9114,7 +10733,7 @@
                   </a:schemeClr>
                 </a:solidFill>
               </a:rPr>
-              <a:t>Testing</a:t>
+              <a:t>Controls</a:t>
             </a:r>
           </a:p>
           <a:p>
@@ -9131,21 +10750,13 @@
     </p:spTree>
     <p:extLst>
       <p:ext uri="{BB962C8B-B14F-4D97-AF65-F5344CB8AC3E}">
-        <p14:creationId xmlns:p14="http://schemas.microsoft.com/office/powerpoint/2010/main" val="3683755532"/>
+        <p14:creationId xmlns:p14="http://schemas.microsoft.com/office/powerpoint/2010/main" val="3838835561"/>
       </p:ext>
     </p:extLst>
   </p:cSld>
   <p:clrMapOvr>
     <a:masterClrMapping/>
   </p:clrMapOvr>
-  <mc:AlternateContent xmlns:mc="http://schemas.openxmlformats.org/markup-compatibility/2006" xmlns:p14="http://schemas.microsoft.com/office/powerpoint/2010/main">
-    <mc:Choice Requires="p14">
-      <p:transition spd="slow" p14:dur="2000"/>
-    </mc:Choice>
-    <mc:Fallback xmlns="">
-      <p:transition spd="slow"/>
-    </mc:Fallback>
-  </mc:AlternateContent>
   <p:timing>
     <p:tnLst>
       <p:par>

</xml_diff>